<commit_message>
almost all programs are ready.
</commit_message>
<xml_diff>
--- a/Img/HSIinstruction.pptx
+++ b/Img/HSIinstruction.pptx
@@ -3775,12 +3775,16 @@
           <a:lstStyle/>
           <a:p>
             <a:r>
-              <a:rPr kumimoji="1" lang="zh-TW" altLang="en-US" dirty="0">
+              <a:rPr kumimoji="1" lang="zh-TW" altLang="en-US">
                 <a:latin typeface="Microsoft JhengHei" panose="020B0604030504040204" pitchFamily="34" charset="-120"/>
                 <a:ea typeface="Microsoft JhengHei" panose="020B0604030504040204" pitchFamily="34" charset="-120"/>
               </a:rPr>
-              <a:t>順時鐘轉</a:t>
-            </a:r>
+              <a:t>向下扳動</a:t>
+            </a:r>
+            <a:endParaRPr kumimoji="1" lang="zh-TW" altLang="en-US" dirty="0">
+              <a:latin typeface="Microsoft JhengHei" panose="020B0604030504040204" pitchFamily="34" charset="-120"/>
+              <a:ea typeface="Microsoft JhengHei" panose="020B0604030504040204" pitchFamily="34" charset="-120"/>
+            </a:endParaRPr>
           </a:p>
         </p:txBody>
       </p:sp>
@@ -3817,7 +3821,7 @@
                 <a:latin typeface="Microsoft JhengHei" panose="020B0604030504040204" pitchFamily="34" charset="-120"/>
                 <a:ea typeface="Microsoft JhengHei" panose="020B0604030504040204" pitchFamily="34" charset="-120"/>
               </a:rPr>
-              <a:t>逆時鐘轉</a:t>
+              <a:t>向上扳動</a:t>
             </a:r>
           </a:p>
         </p:txBody>
@@ -3837,7 +3841,7 @@
         <p:spPr>
           <a:xfrm>
             <a:off x="5774287" y="4779737"/>
-            <a:ext cx="877163" cy="369332"/>
+            <a:ext cx="1107996" cy="369332"/>
           </a:xfrm>
           <a:prstGeom prst="rect">
             <a:avLst/>
@@ -3855,7 +3859,7 @@
                 <a:latin typeface="Microsoft JhengHei" panose="020B0604030504040204" pitchFamily="34" charset="-120"/>
                 <a:ea typeface="Microsoft JhengHei" panose="020B0604030504040204" pitchFamily="34" charset="-120"/>
               </a:rPr>
-              <a:t>按旋鈕</a:t>
+              <a:t>向右扳動</a:t>
             </a:r>
           </a:p>
         </p:txBody>
@@ -3875,7 +3879,7 @@
         <p:spPr>
           <a:xfrm>
             <a:off x="2228785" y="4779737"/>
-            <a:ext cx="877163" cy="369332"/>
+            <a:ext cx="1107996" cy="369332"/>
           </a:xfrm>
           <a:prstGeom prst="rect">
             <a:avLst/>
@@ -3893,7 +3897,7 @@
                 <a:latin typeface="Microsoft JhengHei" panose="020B0604030504040204" pitchFamily="34" charset="-120"/>
                 <a:ea typeface="Microsoft JhengHei" panose="020B0604030504040204" pitchFamily="34" charset="-120"/>
               </a:rPr>
-              <a:t>按按鈕</a:t>
+              <a:t>向左扳動</a:t>
             </a:r>
           </a:p>
         </p:txBody>

</xml_diff>